<commit_message>
finished presentation first draft
</commit_message>
<xml_diff>
--- a/ppt/Calorie Tracker Presentation.pptx
+++ b/ppt/Calorie Tracker Presentation.pptx
@@ -9,6 +9,14 @@
   </p:notesMasterIdLst>
   <p:sldIdLst>
     <p:sldId id="256" r:id="rId6"/>
+    <p:sldId id="257" r:id="rId7"/>
+    <p:sldId id="258" r:id="rId8"/>
+    <p:sldId id="259" r:id="rId9"/>
+    <p:sldId id="260" r:id="rId10"/>
+    <p:sldId id="261" r:id="rId11"/>
+    <p:sldId id="262" r:id="rId12"/>
+    <p:sldId id="263" r:id="rId13"/>
+    <p:sldId id="264" r:id="rId14"/>
   </p:sldIdLst>
   <p:sldSz cy="5143500" cx="9144000"/>
   <p:notesSz cx="6858000" cy="9144000"/>
@@ -741,6 +749,830 @@
       <p:sp>
         <p:nvSpPr>
           <p:cNvPr id="52" name="Google Shape;52;p:notes"/>
+          <p:cNvSpPr txBox="1"/>
+          <p:nvPr>
+            <p:ph idx="1" type="body"/>
+          </p:nvPr>
+        </p:nvSpPr>
+        <p:spPr>
+          <a:xfrm>
+            <a:off x="685800" y="4343400"/>
+            <a:ext cx="5486400" cy="4114800"/>
+          </a:xfrm>
+          <a:prstGeom prst="rect">
+            <a:avLst/>
+          </a:prstGeom>
+        </p:spPr>
+        <p:txBody>
+          <a:bodyPr anchorCtr="0" anchor="t" bIns="91425" lIns="91425" spcFirstLastPara="1" rIns="91425" wrap="square" tIns="91425">
+            <a:noAutofit/>
+          </a:bodyPr>
+          <a:lstStyle/>
+          <a:p>
+            <a:pPr indent="0" lvl="0" marL="0" rtl="0" algn="l">
+              <a:spcBef>
+                <a:spcPts val="0"/>
+              </a:spcBef>
+              <a:spcAft>
+                <a:spcPts val="0"/>
+              </a:spcAft>
+              <a:buNone/>
+            </a:pPr>
+            <a:r>
+              <a:t/>
+            </a:r>
+            <a:endParaRPr/>
+          </a:p>
+        </p:txBody>
+      </p:sp>
+    </p:spTree>
+  </p:cSld>
+  <p:clrMapOvr>
+    <a:masterClrMapping/>
+  </p:clrMapOvr>
+</p:notes>
+</file>
+
+<file path=ppt/notesSlides/notesSlide2.xml><?xml version="1.0" encoding="utf-8"?>
+<p:notes xmlns:a="http://schemas.openxmlformats.org/drawingml/2006/main" xmlns:r="http://schemas.openxmlformats.org/officeDocument/2006/relationships" xmlns:mc="http://schemas.openxmlformats.org/markup-compatibility/2006" xmlns:mv="urn:schemas-microsoft-com:mac:vml" xmlns:p="http://schemas.openxmlformats.org/presentationml/2006/main" xmlns:c="http://schemas.openxmlformats.org/drawingml/2006/chart" xmlns:dgm="http://schemas.openxmlformats.org/drawingml/2006/diagram" xmlns:o="urn:schemas-microsoft-com:office:office" xmlns:v="urn:schemas-microsoft-com:vml" xmlns:pvml="urn:schemas-microsoft-com:office:powerpoint" xmlns:com="http://schemas.openxmlformats.org/drawingml/2006/compatibility" xmlns:p14="http://schemas.microsoft.com/office/powerpoint/2010/main" xmlns:p15="http://schemas.microsoft.com/office/powerpoint/2012/main" xmlns:ahyp="http://schemas.microsoft.com/office/drawing/2018/hyperlinkcolor" showMasterPhAnim="0" showMasterSp="0">
+  <p:cSld>
+    <p:spTree>
+      <p:nvGrpSpPr>
+        <p:cNvPr id="56" name="Shape 56"/>
+        <p:cNvGrpSpPr/>
+        <p:nvPr/>
+      </p:nvGrpSpPr>
+      <p:grpSpPr>
+        <a:xfrm>
+          <a:off x="0" y="0"/>
+          <a:ext cx="0" cy="0"/>
+          <a:chOff x="0" y="0"/>
+          <a:chExt cx="0" cy="0"/>
+        </a:xfrm>
+      </p:grpSpPr>
+      <p:sp>
+        <p:nvSpPr>
+          <p:cNvPr id="57" name="Google Shape;57;g2438775e654_0_45:notes"/>
+          <p:cNvSpPr/>
+          <p:nvPr>
+            <p:ph idx="2" type="sldImg"/>
+          </p:nvPr>
+        </p:nvSpPr>
+        <p:spPr>
+          <a:xfrm>
+            <a:off x="381300" y="685800"/>
+            <a:ext cx="6096000" cy="3429000"/>
+          </a:xfrm>
+          <a:custGeom>
+            <a:rect b="b" l="l" r="r" t="t"/>
+            <a:pathLst>
+              <a:path extrusionOk="0" h="120000" w="120000">
+                <a:moveTo>
+                  <a:pt x="0" y="0"/>
+                </a:moveTo>
+                <a:lnTo>
+                  <a:pt x="120000" y="0"/>
+                </a:lnTo>
+                <a:lnTo>
+                  <a:pt x="120000" y="120000"/>
+                </a:lnTo>
+                <a:lnTo>
+                  <a:pt x="0" y="120000"/>
+                </a:lnTo>
+                <a:close/>
+              </a:path>
+            </a:pathLst>
+          </a:custGeom>
+        </p:spPr>
+      </p:sp>
+      <p:sp>
+        <p:nvSpPr>
+          <p:cNvPr id="58" name="Google Shape;58;g2438775e654_0_45:notes"/>
+          <p:cNvSpPr txBox="1"/>
+          <p:nvPr>
+            <p:ph idx="1" type="body"/>
+          </p:nvPr>
+        </p:nvSpPr>
+        <p:spPr>
+          <a:xfrm>
+            <a:off x="685800" y="4343400"/>
+            <a:ext cx="5486400" cy="4114800"/>
+          </a:xfrm>
+          <a:prstGeom prst="rect">
+            <a:avLst/>
+          </a:prstGeom>
+        </p:spPr>
+        <p:txBody>
+          <a:bodyPr anchorCtr="0" anchor="t" bIns="91425" lIns="91425" spcFirstLastPara="1" rIns="91425" wrap="square" tIns="91425">
+            <a:noAutofit/>
+          </a:bodyPr>
+          <a:lstStyle/>
+          <a:p>
+            <a:pPr indent="0" lvl="0" marL="0" rtl="0" algn="l">
+              <a:spcBef>
+                <a:spcPts val="0"/>
+              </a:spcBef>
+              <a:spcAft>
+                <a:spcPts val="0"/>
+              </a:spcAft>
+              <a:buNone/>
+            </a:pPr>
+            <a:r>
+              <a:rPr lang="en"/>
+              <a:t>Formula for calorie recommendation is a very rough approximation based on the </a:t>
+            </a:r>
+            <a:r>
+              <a:rPr lang="en" sz="1050">
+                <a:solidFill>
+                  <a:schemeClr val="dk1"/>
+                </a:solidFill>
+                <a:highlight>
+                  <a:srgbClr val="1D1F20"/>
+                </a:highlight>
+              </a:rPr>
+              <a:t>Harris-Benedict Formula</a:t>
+            </a:r>
+            <a:r>
+              <a:rPr lang="en"/>
+              <a:t>: </a:t>
+            </a:r>
+            <a:endParaRPr/>
+          </a:p>
+          <a:p>
+            <a:pPr indent="0" lvl="0" marL="0" rtl="0" algn="l">
+              <a:spcBef>
+                <a:spcPts val="0"/>
+              </a:spcBef>
+              <a:spcAft>
+                <a:spcPts val="0"/>
+              </a:spcAft>
+              <a:buNone/>
+            </a:pPr>
+            <a:r>
+              <a:rPr lang="en"/>
+              <a:t>14 * weight + 5 * height</a:t>
+            </a:r>
+            <a:endParaRPr/>
+          </a:p>
+        </p:txBody>
+      </p:sp>
+    </p:spTree>
+  </p:cSld>
+  <p:clrMapOvr>
+    <a:masterClrMapping/>
+  </p:clrMapOvr>
+</p:notes>
+</file>
+
+<file path=ppt/notesSlides/notesSlide3.xml><?xml version="1.0" encoding="utf-8"?>
+<p:notes xmlns:a="http://schemas.openxmlformats.org/drawingml/2006/main" xmlns:r="http://schemas.openxmlformats.org/officeDocument/2006/relationships" xmlns:mc="http://schemas.openxmlformats.org/markup-compatibility/2006" xmlns:mv="urn:schemas-microsoft-com:mac:vml" xmlns:p="http://schemas.openxmlformats.org/presentationml/2006/main" xmlns:c="http://schemas.openxmlformats.org/drawingml/2006/chart" xmlns:dgm="http://schemas.openxmlformats.org/drawingml/2006/diagram" xmlns:o="urn:schemas-microsoft-com:office:office" xmlns:v="urn:schemas-microsoft-com:vml" xmlns:pvml="urn:schemas-microsoft-com:office:powerpoint" xmlns:com="http://schemas.openxmlformats.org/drawingml/2006/compatibility" xmlns:p14="http://schemas.microsoft.com/office/powerpoint/2010/main" xmlns:p15="http://schemas.microsoft.com/office/powerpoint/2012/main" xmlns:ahyp="http://schemas.microsoft.com/office/drawing/2018/hyperlinkcolor" showMasterPhAnim="0" showMasterSp="0">
+  <p:cSld>
+    <p:spTree>
+      <p:nvGrpSpPr>
+        <p:cNvPr id="62" name="Shape 62"/>
+        <p:cNvGrpSpPr/>
+        <p:nvPr/>
+      </p:nvGrpSpPr>
+      <p:grpSpPr>
+        <a:xfrm>
+          <a:off x="0" y="0"/>
+          <a:ext cx="0" cy="0"/>
+          <a:chOff x="0" y="0"/>
+          <a:chExt cx="0" cy="0"/>
+        </a:xfrm>
+      </p:grpSpPr>
+      <p:sp>
+        <p:nvSpPr>
+          <p:cNvPr id="63" name="Google Shape;63;g2438775e654_0_51:notes"/>
+          <p:cNvSpPr/>
+          <p:nvPr>
+            <p:ph idx="2" type="sldImg"/>
+          </p:nvPr>
+        </p:nvSpPr>
+        <p:spPr>
+          <a:xfrm>
+            <a:off x="381300" y="685800"/>
+            <a:ext cx="6096000" cy="3429000"/>
+          </a:xfrm>
+          <a:custGeom>
+            <a:rect b="b" l="l" r="r" t="t"/>
+            <a:pathLst>
+              <a:path extrusionOk="0" h="120000" w="120000">
+                <a:moveTo>
+                  <a:pt x="0" y="0"/>
+                </a:moveTo>
+                <a:lnTo>
+                  <a:pt x="120000" y="0"/>
+                </a:lnTo>
+                <a:lnTo>
+                  <a:pt x="120000" y="120000"/>
+                </a:lnTo>
+                <a:lnTo>
+                  <a:pt x="0" y="120000"/>
+                </a:lnTo>
+                <a:close/>
+              </a:path>
+            </a:pathLst>
+          </a:custGeom>
+        </p:spPr>
+      </p:sp>
+      <p:sp>
+        <p:nvSpPr>
+          <p:cNvPr id="64" name="Google Shape;64;g2438775e654_0_51:notes"/>
+          <p:cNvSpPr txBox="1"/>
+          <p:nvPr>
+            <p:ph idx="1" type="body"/>
+          </p:nvPr>
+        </p:nvSpPr>
+        <p:spPr>
+          <a:xfrm>
+            <a:off x="685800" y="4343400"/>
+            <a:ext cx="5486400" cy="4114800"/>
+          </a:xfrm>
+          <a:prstGeom prst="rect">
+            <a:avLst/>
+          </a:prstGeom>
+        </p:spPr>
+        <p:txBody>
+          <a:bodyPr anchorCtr="0" anchor="t" bIns="91425" lIns="91425" spcFirstLastPara="1" rIns="91425" wrap="square" tIns="91425">
+            <a:noAutofit/>
+          </a:bodyPr>
+          <a:lstStyle/>
+          <a:p>
+            <a:pPr indent="0" lvl="0" marL="0" rtl="0" algn="l">
+              <a:spcBef>
+                <a:spcPts val="0"/>
+              </a:spcBef>
+              <a:spcAft>
+                <a:spcPts val="0"/>
+              </a:spcAft>
+              <a:buNone/>
+            </a:pPr>
+            <a:r>
+              <a:t/>
+            </a:r>
+            <a:endParaRPr/>
+          </a:p>
+        </p:txBody>
+      </p:sp>
+    </p:spTree>
+  </p:cSld>
+  <p:clrMapOvr>
+    <a:masterClrMapping/>
+  </p:clrMapOvr>
+</p:notes>
+</file>
+
+<file path=ppt/notesSlides/notesSlide4.xml><?xml version="1.0" encoding="utf-8"?>
+<p:notes xmlns:a="http://schemas.openxmlformats.org/drawingml/2006/main" xmlns:r="http://schemas.openxmlformats.org/officeDocument/2006/relationships" xmlns:mc="http://schemas.openxmlformats.org/markup-compatibility/2006" xmlns:mv="urn:schemas-microsoft-com:mac:vml" xmlns:p="http://schemas.openxmlformats.org/presentationml/2006/main" xmlns:c="http://schemas.openxmlformats.org/drawingml/2006/chart" xmlns:dgm="http://schemas.openxmlformats.org/drawingml/2006/diagram" xmlns:o="urn:schemas-microsoft-com:office:office" xmlns:v="urn:schemas-microsoft-com:vml" xmlns:pvml="urn:schemas-microsoft-com:office:powerpoint" xmlns:com="http://schemas.openxmlformats.org/drawingml/2006/compatibility" xmlns:p14="http://schemas.microsoft.com/office/powerpoint/2010/main" xmlns:p15="http://schemas.microsoft.com/office/powerpoint/2012/main" xmlns:ahyp="http://schemas.microsoft.com/office/drawing/2018/hyperlinkcolor" showMasterPhAnim="0" showMasterSp="0">
+  <p:cSld>
+    <p:spTree>
+      <p:nvGrpSpPr>
+        <p:cNvPr id="68" name="Shape 68"/>
+        <p:cNvGrpSpPr/>
+        <p:nvPr/>
+      </p:nvGrpSpPr>
+      <p:grpSpPr>
+        <a:xfrm>
+          <a:off x="0" y="0"/>
+          <a:ext cx="0" cy="0"/>
+          <a:chOff x="0" y="0"/>
+          <a:chExt cx="0" cy="0"/>
+        </a:xfrm>
+      </p:grpSpPr>
+      <p:sp>
+        <p:nvSpPr>
+          <p:cNvPr id="69" name="Google Shape;69;g2438775e654_0_56:notes"/>
+          <p:cNvSpPr/>
+          <p:nvPr>
+            <p:ph idx="2" type="sldImg"/>
+          </p:nvPr>
+        </p:nvSpPr>
+        <p:spPr>
+          <a:xfrm>
+            <a:off x="381300" y="685800"/>
+            <a:ext cx="6096000" cy="3429000"/>
+          </a:xfrm>
+          <a:custGeom>
+            <a:rect b="b" l="l" r="r" t="t"/>
+            <a:pathLst>
+              <a:path extrusionOk="0" h="120000" w="120000">
+                <a:moveTo>
+                  <a:pt x="0" y="0"/>
+                </a:moveTo>
+                <a:lnTo>
+                  <a:pt x="120000" y="0"/>
+                </a:lnTo>
+                <a:lnTo>
+                  <a:pt x="120000" y="120000"/>
+                </a:lnTo>
+                <a:lnTo>
+                  <a:pt x="0" y="120000"/>
+                </a:lnTo>
+                <a:close/>
+              </a:path>
+            </a:pathLst>
+          </a:custGeom>
+        </p:spPr>
+      </p:sp>
+      <p:sp>
+        <p:nvSpPr>
+          <p:cNvPr id="70" name="Google Shape;70;g2438775e654_0_56:notes"/>
+          <p:cNvSpPr txBox="1"/>
+          <p:nvPr>
+            <p:ph idx="1" type="body"/>
+          </p:nvPr>
+        </p:nvSpPr>
+        <p:spPr>
+          <a:xfrm>
+            <a:off x="685800" y="4343400"/>
+            <a:ext cx="5486400" cy="4114800"/>
+          </a:xfrm>
+          <a:prstGeom prst="rect">
+            <a:avLst/>
+          </a:prstGeom>
+        </p:spPr>
+        <p:txBody>
+          <a:bodyPr anchorCtr="0" anchor="t" bIns="91425" lIns="91425" spcFirstLastPara="1" rIns="91425" wrap="square" tIns="91425">
+            <a:noAutofit/>
+          </a:bodyPr>
+          <a:lstStyle/>
+          <a:p>
+            <a:pPr indent="0" lvl="0" marL="0" rtl="0" algn="l">
+              <a:spcBef>
+                <a:spcPts val="0"/>
+              </a:spcBef>
+              <a:spcAft>
+                <a:spcPts val="0"/>
+              </a:spcAft>
+              <a:buNone/>
+            </a:pPr>
+            <a:r>
+              <a:t/>
+            </a:r>
+            <a:endParaRPr/>
+          </a:p>
+        </p:txBody>
+      </p:sp>
+    </p:spTree>
+  </p:cSld>
+  <p:clrMapOvr>
+    <a:masterClrMapping/>
+  </p:clrMapOvr>
+</p:notes>
+</file>
+
+<file path=ppt/notesSlides/notesSlide5.xml><?xml version="1.0" encoding="utf-8"?>
+<p:notes xmlns:a="http://schemas.openxmlformats.org/drawingml/2006/main" xmlns:r="http://schemas.openxmlformats.org/officeDocument/2006/relationships" xmlns:mc="http://schemas.openxmlformats.org/markup-compatibility/2006" xmlns:mv="urn:schemas-microsoft-com:mac:vml" xmlns:p="http://schemas.openxmlformats.org/presentationml/2006/main" xmlns:c="http://schemas.openxmlformats.org/drawingml/2006/chart" xmlns:dgm="http://schemas.openxmlformats.org/drawingml/2006/diagram" xmlns:o="urn:schemas-microsoft-com:office:office" xmlns:v="urn:schemas-microsoft-com:vml" xmlns:pvml="urn:schemas-microsoft-com:office:powerpoint" xmlns:com="http://schemas.openxmlformats.org/drawingml/2006/compatibility" xmlns:p14="http://schemas.microsoft.com/office/powerpoint/2010/main" xmlns:p15="http://schemas.microsoft.com/office/powerpoint/2012/main" xmlns:ahyp="http://schemas.microsoft.com/office/drawing/2018/hyperlinkcolor" showMasterPhAnim="0" showMasterSp="0">
+  <p:cSld>
+    <p:spTree>
+      <p:nvGrpSpPr>
+        <p:cNvPr id="74" name="Shape 74"/>
+        <p:cNvGrpSpPr/>
+        <p:nvPr/>
+      </p:nvGrpSpPr>
+      <p:grpSpPr>
+        <a:xfrm>
+          <a:off x="0" y="0"/>
+          <a:ext cx="0" cy="0"/>
+          <a:chOff x="0" y="0"/>
+          <a:chExt cx="0" cy="0"/>
+        </a:xfrm>
+      </p:grpSpPr>
+      <p:sp>
+        <p:nvSpPr>
+          <p:cNvPr id="75" name="Google Shape;75;g2438775e654_0_61:notes"/>
+          <p:cNvSpPr/>
+          <p:nvPr>
+            <p:ph idx="2" type="sldImg"/>
+          </p:nvPr>
+        </p:nvSpPr>
+        <p:spPr>
+          <a:xfrm>
+            <a:off x="381300" y="685800"/>
+            <a:ext cx="6096000" cy="3429000"/>
+          </a:xfrm>
+          <a:custGeom>
+            <a:rect b="b" l="l" r="r" t="t"/>
+            <a:pathLst>
+              <a:path extrusionOk="0" h="120000" w="120000">
+                <a:moveTo>
+                  <a:pt x="0" y="0"/>
+                </a:moveTo>
+                <a:lnTo>
+                  <a:pt x="120000" y="0"/>
+                </a:lnTo>
+                <a:lnTo>
+                  <a:pt x="120000" y="120000"/>
+                </a:lnTo>
+                <a:lnTo>
+                  <a:pt x="0" y="120000"/>
+                </a:lnTo>
+                <a:close/>
+              </a:path>
+            </a:pathLst>
+          </a:custGeom>
+        </p:spPr>
+      </p:sp>
+      <p:sp>
+        <p:nvSpPr>
+          <p:cNvPr id="76" name="Google Shape;76;g2438775e654_0_61:notes"/>
+          <p:cNvSpPr txBox="1"/>
+          <p:nvPr>
+            <p:ph idx="1" type="body"/>
+          </p:nvPr>
+        </p:nvSpPr>
+        <p:spPr>
+          <a:xfrm>
+            <a:off x="685800" y="4343400"/>
+            <a:ext cx="5486400" cy="4114800"/>
+          </a:xfrm>
+          <a:prstGeom prst="rect">
+            <a:avLst/>
+          </a:prstGeom>
+        </p:spPr>
+        <p:txBody>
+          <a:bodyPr anchorCtr="0" anchor="t" bIns="91425" lIns="91425" spcFirstLastPara="1" rIns="91425" wrap="square" tIns="91425">
+            <a:noAutofit/>
+          </a:bodyPr>
+          <a:lstStyle/>
+          <a:p>
+            <a:pPr indent="0" lvl="0" marL="0" rtl="0" algn="l">
+              <a:spcBef>
+                <a:spcPts val="0"/>
+              </a:spcBef>
+              <a:spcAft>
+                <a:spcPts val="0"/>
+              </a:spcAft>
+              <a:buNone/>
+            </a:pPr>
+            <a:r>
+              <a:t/>
+            </a:r>
+            <a:endParaRPr/>
+          </a:p>
+        </p:txBody>
+      </p:sp>
+    </p:spTree>
+  </p:cSld>
+  <p:clrMapOvr>
+    <a:masterClrMapping/>
+  </p:clrMapOvr>
+</p:notes>
+</file>
+
+<file path=ppt/notesSlides/notesSlide6.xml><?xml version="1.0" encoding="utf-8"?>
+<p:notes xmlns:a="http://schemas.openxmlformats.org/drawingml/2006/main" xmlns:r="http://schemas.openxmlformats.org/officeDocument/2006/relationships" xmlns:mc="http://schemas.openxmlformats.org/markup-compatibility/2006" xmlns:mv="urn:schemas-microsoft-com:mac:vml" xmlns:p="http://schemas.openxmlformats.org/presentationml/2006/main" xmlns:c="http://schemas.openxmlformats.org/drawingml/2006/chart" xmlns:dgm="http://schemas.openxmlformats.org/drawingml/2006/diagram" xmlns:o="urn:schemas-microsoft-com:office:office" xmlns:v="urn:schemas-microsoft-com:vml" xmlns:pvml="urn:schemas-microsoft-com:office:powerpoint" xmlns:com="http://schemas.openxmlformats.org/drawingml/2006/compatibility" xmlns:p14="http://schemas.microsoft.com/office/powerpoint/2010/main" xmlns:p15="http://schemas.microsoft.com/office/powerpoint/2012/main" xmlns:ahyp="http://schemas.microsoft.com/office/drawing/2018/hyperlinkcolor" showMasterPhAnim="0" showMasterSp="0">
+  <p:cSld>
+    <p:spTree>
+      <p:nvGrpSpPr>
+        <p:cNvPr id="80" name="Shape 80"/>
+        <p:cNvGrpSpPr/>
+        <p:nvPr/>
+      </p:nvGrpSpPr>
+      <p:grpSpPr>
+        <a:xfrm>
+          <a:off x="0" y="0"/>
+          <a:ext cx="0" cy="0"/>
+          <a:chOff x="0" y="0"/>
+          <a:chExt cx="0" cy="0"/>
+        </a:xfrm>
+      </p:grpSpPr>
+      <p:sp>
+        <p:nvSpPr>
+          <p:cNvPr id="81" name="Google Shape;81;g2438775e654_0_66:notes"/>
+          <p:cNvSpPr/>
+          <p:nvPr>
+            <p:ph idx="2" type="sldImg"/>
+          </p:nvPr>
+        </p:nvSpPr>
+        <p:spPr>
+          <a:xfrm>
+            <a:off x="381300" y="685800"/>
+            <a:ext cx="6096000" cy="3429000"/>
+          </a:xfrm>
+          <a:custGeom>
+            <a:rect b="b" l="l" r="r" t="t"/>
+            <a:pathLst>
+              <a:path extrusionOk="0" h="120000" w="120000">
+                <a:moveTo>
+                  <a:pt x="0" y="0"/>
+                </a:moveTo>
+                <a:lnTo>
+                  <a:pt x="120000" y="0"/>
+                </a:lnTo>
+                <a:lnTo>
+                  <a:pt x="120000" y="120000"/>
+                </a:lnTo>
+                <a:lnTo>
+                  <a:pt x="0" y="120000"/>
+                </a:lnTo>
+                <a:close/>
+              </a:path>
+            </a:pathLst>
+          </a:custGeom>
+        </p:spPr>
+      </p:sp>
+      <p:sp>
+        <p:nvSpPr>
+          <p:cNvPr id="82" name="Google Shape;82;g2438775e654_0_66:notes"/>
+          <p:cNvSpPr txBox="1"/>
+          <p:nvPr>
+            <p:ph idx="1" type="body"/>
+          </p:nvPr>
+        </p:nvSpPr>
+        <p:spPr>
+          <a:xfrm>
+            <a:off x="685800" y="4343400"/>
+            <a:ext cx="5486400" cy="4114800"/>
+          </a:xfrm>
+          <a:prstGeom prst="rect">
+            <a:avLst/>
+          </a:prstGeom>
+        </p:spPr>
+        <p:txBody>
+          <a:bodyPr anchorCtr="0" anchor="t" bIns="91425" lIns="91425" spcFirstLastPara="1" rIns="91425" wrap="square" tIns="91425">
+            <a:noAutofit/>
+          </a:bodyPr>
+          <a:lstStyle/>
+          <a:p>
+            <a:pPr indent="0" lvl="0" marL="0" rtl="0" algn="l">
+              <a:spcBef>
+                <a:spcPts val="0"/>
+              </a:spcBef>
+              <a:spcAft>
+                <a:spcPts val="0"/>
+              </a:spcAft>
+              <a:buNone/>
+            </a:pPr>
+            <a:r>
+              <a:t/>
+            </a:r>
+            <a:endParaRPr/>
+          </a:p>
+        </p:txBody>
+      </p:sp>
+    </p:spTree>
+  </p:cSld>
+  <p:clrMapOvr>
+    <a:masterClrMapping/>
+  </p:clrMapOvr>
+</p:notes>
+</file>
+
+<file path=ppt/notesSlides/notesSlide7.xml><?xml version="1.0" encoding="utf-8"?>
+<p:notes xmlns:a="http://schemas.openxmlformats.org/drawingml/2006/main" xmlns:r="http://schemas.openxmlformats.org/officeDocument/2006/relationships" xmlns:mc="http://schemas.openxmlformats.org/markup-compatibility/2006" xmlns:mv="urn:schemas-microsoft-com:mac:vml" xmlns:p="http://schemas.openxmlformats.org/presentationml/2006/main" xmlns:c="http://schemas.openxmlformats.org/drawingml/2006/chart" xmlns:dgm="http://schemas.openxmlformats.org/drawingml/2006/diagram" xmlns:o="urn:schemas-microsoft-com:office:office" xmlns:v="urn:schemas-microsoft-com:vml" xmlns:pvml="urn:schemas-microsoft-com:office:powerpoint" xmlns:com="http://schemas.openxmlformats.org/drawingml/2006/compatibility" xmlns:p14="http://schemas.microsoft.com/office/powerpoint/2010/main" xmlns:p15="http://schemas.microsoft.com/office/powerpoint/2012/main" xmlns:ahyp="http://schemas.microsoft.com/office/drawing/2018/hyperlinkcolor" showMasterPhAnim="0" showMasterSp="0">
+  <p:cSld>
+    <p:spTree>
+      <p:nvGrpSpPr>
+        <p:cNvPr id="86" name="Shape 86"/>
+        <p:cNvGrpSpPr/>
+        <p:nvPr/>
+      </p:nvGrpSpPr>
+      <p:grpSpPr>
+        <a:xfrm>
+          <a:off x="0" y="0"/>
+          <a:ext cx="0" cy="0"/>
+          <a:chOff x="0" y="0"/>
+          <a:chExt cx="0" cy="0"/>
+        </a:xfrm>
+      </p:grpSpPr>
+      <p:sp>
+        <p:nvSpPr>
+          <p:cNvPr id="87" name="Google Shape;87;g2438775e654_0_86:notes"/>
+          <p:cNvSpPr/>
+          <p:nvPr>
+            <p:ph idx="2" type="sldImg"/>
+          </p:nvPr>
+        </p:nvSpPr>
+        <p:spPr>
+          <a:xfrm>
+            <a:off x="381300" y="685800"/>
+            <a:ext cx="6096000" cy="3429000"/>
+          </a:xfrm>
+          <a:custGeom>
+            <a:rect b="b" l="l" r="r" t="t"/>
+            <a:pathLst>
+              <a:path extrusionOk="0" h="120000" w="120000">
+                <a:moveTo>
+                  <a:pt x="0" y="0"/>
+                </a:moveTo>
+                <a:lnTo>
+                  <a:pt x="120000" y="0"/>
+                </a:lnTo>
+                <a:lnTo>
+                  <a:pt x="120000" y="120000"/>
+                </a:lnTo>
+                <a:lnTo>
+                  <a:pt x="0" y="120000"/>
+                </a:lnTo>
+                <a:close/>
+              </a:path>
+            </a:pathLst>
+          </a:custGeom>
+        </p:spPr>
+      </p:sp>
+      <p:sp>
+        <p:nvSpPr>
+          <p:cNvPr id="88" name="Google Shape;88;g2438775e654_0_86:notes"/>
+          <p:cNvSpPr txBox="1"/>
+          <p:nvPr>
+            <p:ph idx="1" type="body"/>
+          </p:nvPr>
+        </p:nvSpPr>
+        <p:spPr>
+          <a:xfrm>
+            <a:off x="685800" y="4343400"/>
+            <a:ext cx="5486400" cy="4114800"/>
+          </a:xfrm>
+          <a:prstGeom prst="rect">
+            <a:avLst/>
+          </a:prstGeom>
+        </p:spPr>
+        <p:txBody>
+          <a:bodyPr anchorCtr="0" anchor="t" bIns="91425" lIns="91425" spcFirstLastPara="1" rIns="91425" wrap="square" tIns="91425">
+            <a:noAutofit/>
+          </a:bodyPr>
+          <a:lstStyle/>
+          <a:p>
+            <a:pPr indent="0" lvl="0" marL="0" rtl="0" algn="l">
+              <a:spcBef>
+                <a:spcPts val="0"/>
+              </a:spcBef>
+              <a:spcAft>
+                <a:spcPts val="0"/>
+              </a:spcAft>
+              <a:buNone/>
+            </a:pPr>
+            <a:r>
+              <a:t/>
+            </a:r>
+            <a:endParaRPr/>
+          </a:p>
+        </p:txBody>
+      </p:sp>
+    </p:spTree>
+  </p:cSld>
+  <p:clrMapOvr>
+    <a:masterClrMapping/>
+  </p:clrMapOvr>
+</p:notes>
+</file>
+
+<file path=ppt/notesSlides/notesSlide8.xml><?xml version="1.0" encoding="utf-8"?>
+<p:notes xmlns:a="http://schemas.openxmlformats.org/drawingml/2006/main" xmlns:r="http://schemas.openxmlformats.org/officeDocument/2006/relationships" xmlns:mc="http://schemas.openxmlformats.org/markup-compatibility/2006" xmlns:mv="urn:schemas-microsoft-com:mac:vml" xmlns:p="http://schemas.openxmlformats.org/presentationml/2006/main" xmlns:c="http://schemas.openxmlformats.org/drawingml/2006/chart" xmlns:dgm="http://schemas.openxmlformats.org/drawingml/2006/diagram" xmlns:o="urn:schemas-microsoft-com:office:office" xmlns:v="urn:schemas-microsoft-com:vml" xmlns:pvml="urn:schemas-microsoft-com:office:powerpoint" xmlns:com="http://schemas.openxmlformats.org/drawingml/2006/compatibility" xmlns:p14="http://schemas.microsoft.com/office/powerpoint/2010/main" xmlns:p15="http://schemas.microsoft.com/office/powerpoint/2012/main" xmlns:ahyp="http://schemas.microsoft.com/office/drawing/2018/hyperlinkcolor" showMasterPhAnim="0" showMasterSp="0">
+  <p:cSld>
+    <p:spTree>
+      <p:nvGrpSpPr>
+        <p:cNvPr id="91" name="Shape 91"/>
+        <p:cNvGrpSpPr/>
+        <p:nvPr/>
+      </p:nvGrpSpPr>
+      <p:grpSpPr>
+        <a:xfrm>
+          <a:off x="0" y="0"/>
+          <a:ext cx="0" cy="0"/>
+          <a:chOff x="0" y="0"/>
+          <a:chExt cx="0" cy="0"/>
+        </a:xfrm>
+      </p:grpSpPr>
+      <p:sp>
+        <p:nvSpPr>
+          <p:cNvPr id="92" name="Google Shape;92;g2438775e654_0_90:notes"/>
+          <p:cNvSpPr/>
+          <p:nvPr>
+            <p:ph idx="2" type="sldImg"/>
+          </p:nvPr>
+        </p:nvSpPr>
+        <p:spPr>
+          <a:xfrm>
+            <a:off x="381300" y="685800"/>
+            <a:ext cx="6096000" cy="3429000"/>
+          </a:xfrm>
+          <a:custGeom>
+            <a:rect b="b" l="l" r="r" t="t"/>
+            <a:pathLst>
+              <a:path extrusionOk="0" h="120000" w="120000">
+                <a:moveTo>
+                  <a:pt x="0" y="0"/>
+                </a:moveTo>
+                <a:lnTo>
+                  <a:pt x="120000" y="0"/>
+                </a:lnTo>
+                <a:lnTo>
+                  <a:pt x="120000" y="120000"/>
+                </a:lnTo>
+                <a:lnTo>
+                  <a:pt x="0" y="120000"/>
+                </a:lnTo>
+                <a:close/>
+              </a:path>
+            </a:pathLst>
+          </a:custGeom>
+        </p:spPr>
+      </p:sp>
+      <p:sp>
+        <p:nvSpPr>
+          <p:cNvPr id="93" name="Google Shape;93;g2438775e654_0_90:notes"/>
+          <p:cNvSpPr txBox="1"/>
+          <p:nvPr>
+            <p:ph idx="1" type="body"/>
+          </p:nvPr>
+        </p:nvSpPr>
+        <p:spPr>
+          <a:xfrm>
+            <a:off x="685800" y="4343400"/>
+            <a:ext cx="5486400" cy="4114800"/>
+          </a:xfrm>
+          <a:prstGeom prst="rect">
+            <a:avLst/>
+          </a:prstGeom>
+        </p:spPr>
+        <p:txBody>
+          <a:bodyPr anchorCtr="0" anchor="t" bIns="91425" lIns="91425" spcFirstLastPara="1" rIns="91425" wrap="square" tIns="91425">
+            <a:noAutofit/>
+          </a:bodyPr>
+          <a:lstStyle/>
+          <a:p>
+            <a:pPr indent="0" lvl="0" marL="0" rtl="0" algn="l">
+              <a:spcBef>
+                <a:spcPts val="0"/>
+              </a:spcBef>
+              <a:spcAft>
+                <a:spcPts val="0"/>
+              </a:spcAft>
+              <a:buNone/>
+            </a:pPr>
+            <a:r>
+              <a:t/>
+            </a:r>
+            <a:endParaRPr/>
+          </a:p>
+        </p:txBody>
+      </p:sp>
+    </p:spTree>
+  </p:cSld>
+  <p:clrMapOvr>
+    <a:masterClrMapping/>
+  </p:clrMapOvr>
+</p:notes>
+</file>
+
+<file path=ppt/notesSlides/notesSlide9.xml><?xml version="1.0" encoding="utf-8"?>
+<p:notes xmlns:a="http://schemas.openxmlformats.org/drawingml/2006/main" xmlns:r="http://schemas.openxmlformats.org/officeDocument/2006/relationships" xmlns:mc="http://schemas.openxmlformats.org/markup-compatibility/2006" xmlns:mv="urn:schemas-microsoft-com:mac:vml" xmlns:p="http://schemas.openxmlformats.org/presentationml/2006/main" xmlns:c="http://schemas.openxmlformats.org/drawingml/2006/chart" xmlns:dgm="http://schemas.openxmlformats.org/drawingml/2006/diagram" xmlns:o="urn:schemas-microsoft-com:office:office" xmlns:v="urn:schemas-microsoft-com:vml" xmlns:pvml="urn:schemas-microsoft-com:office:powerpoint" xmlns:com="http://schemas.openxmlformats.org/drawingml/2006/compatibility" xmlns:p14="http://schemas.microsoft.com/office/powerpoint/2010/main" xmlns:p15="http://schemas.microsoft.com/office/powerpoint/2012/main" xmlns:ahyp="http://schemas.microsoft.com/office/drawing/2018/hyperlinkcolor" showMasterPhAnim="0" showMasterSp="0">
+  <p:cSld>
+    <p:spTree>
+      <p:nvGrpSpPr>
+        <p:cNvPr id="96" name="Shape 96"/>
+        <p:cNvGrpSpPr/>
+        <p:nvPr/>
+      </p:nvGrpSpPr>
+      <p:grpSpPr>
+        <a:xfrm>
+          <a:off x="0" y="0"/>
+          <a:ext cx="0" cy="0"/>
+          <a:chOff x="0" y="0"/>
+          <a:chExt cx="0" cy="0"/>
+        </a:xfrm>
+      </p:grpSpPr>
+      <p:sp>
+        <p:nvSpPr>
+          <p:cNvPr id="97" name="Google Shape;97;g2438775e654_0_94:notes"/>
+          <p:cNvSpPr/>
+          <p:nvPr>
+            <p:ph idx="2" type="sldImg"/>
+          </p:nvPr>
+        </p:nvSpPr>
+        <p:spPr>
+          <a:xfrm>
+            <a:off x="381300" y="685800"/>
+            <a:ext cx="6096000" cy="3429000"/>
+          </a:xfrm>
+          <a:custGeom>
+            <a:rect b="b" l="l" r="r" t="t"/>
+            <a:pathLst>
+              <a:path extrusionOk="0" h="120000" w="120000">
+                <a:moveTo>
+                  <a:pt x="0" y="0"/>
+                </a:moveTo>
+                <a:lnTo>
+                  <a:pt x="120000" y="0"/>
+                </a:lnTo>
+                <a:lnTo>
+                  <a:pt x="120000" y="120000"/>
+                </a:lnTo>
+                <a:lnTo>
+                  <a:pt x="0" y="120000"/>
+                </a:lnTo>
+                <a:close/>
+              </a:path>
+            </a:pathLst>
+          </a:custGeom>
+        </p:spPr>
+      </p:sp>
+      <p:sp>
+        <p:nvSpPr>
+          <p:cNvPr id="98" name="Google Shape;98;g2438775e654_0_94:notes"/>
           <p:cNvSpPr txBox="1"/>
           <p:nvPr>
             <p:ph idx="1" type="body"/>
@@ -5602,6 +6434,1174 @@
 </p:sld>
 </file>
 
+<file path=ppt/slides/slide2.xml><?xml version="1.0" encoding="utf-8"?>
+<p:sld xmlns:a="http://schemas.openxmlformats.org/drawingml/2006/main" xmlns:r="http://schemas.openxmlformats.org/officeDocument/2006/relationships" xmlns:mc="http://schemas.openxmlformats.org/markup-compatibility/2006" xmlns:mv="urn:schemas-microsoft-com:mac:vml" xmlns:p="http://schemas.openxmlformats.org/presentationml/2006/main" xmlns:c="http://schemas.openxmlformats.org/drawingml/2006/chart" xmlns:dgm="http://schemas.openxmlformats.org/drawingml/2006/diagram" xmlns:o="urn:schemas-microsoft-com:office:office" xmlns:v="urn:schemas-microsoft-com:vml" xmlns:pvml="urn:schemas-microsoft-com:office:powerpoint" xmlns:com="http://schemas.openxmlformats.org/drawingml/2006/compatibility" xmlns:p14="http://schemas.microsoft.com/office/powerpoint/2010/main" xmlns:p15="http://schemas.microsoft.com/office/powerpoint/2012/main" xmlns:ahyp="http://schemas.microsoft.com/office/drawing/2018/hyperlinkcolor">
+  <p:cSld>
+    <p:spTree>
+      <p:nvGrpSpPr>
+        <p:cNvPr id="59" name="Shape 59"/>
+        <p:cNvGrpSpPr/>
+        <p:nvPr/>
+      </p:nvGrpSpPr>
+      <p:grpSpPr>
+        <a:xfrm>
+          <a:off x="0" y="0"/>
+          <a:ext cx="0" cy="0"/>
+          <a:chOff x="0" y="0"/>
+          <a:chExt cx="0" cy="0"/>
+        </a:xfrm>
+      </p:grpSpPr>
+      <p:sp>
+        <p:nvSpPr>
+          <p:cNvPr id="60" name="Google Shape;60;p14"/>
+          <p:cNvSpPr txBox="1"/>
+          <p:nvPr>
+            <p:ph type="title"/>
+          </p:nvPr>
+        </p:nvSpPr>
+        <p:spPr>
+          <a:xfrm>
+            <a:off x="311700" y="445025"/>
+            <a:ext cx="8520600" cy="572700"/>
+          </a:xfrm>
+          <a:prstGeom prst="rect">
+            <a:avLst/>
+          </a:prstGeom>
+        </p:spPr>
+        <p:txBody>
+          <a:bodyPr anchorCtr="0" anchor="t" bIns="91425" lIns="91425" spcFirstLastPara="1" rIns="91425" wrap="square" tIns="91425">
+            <a:normAutofit fontScale="90000"/>
+          </a:bodyPr>
+          <a:lstStyle/>
+          <a:p>
+            <a:pPr indent="0" lvl="0" marL="0" rtl="0" algn="l">
+              <a:spcBef>
+                <a:spcPts val="0"/>
+              </a:spcBef>
+              <a:spcAft>
+                <a:spcPts val="0"/>
+              </a:spcAft>
+              <a:buNone/>
+            </a:pPr>
+            <a:r>
+              <a:rPr lang="en"/>
+              <a:t>Feature list</a:t>
+            </a:r>
+            <a:endParaRPr/>
+          </a:p>
+        </p:txBody>
+      </p:sp>
+      <p:sp>
+        <p:nvSpPr>
+          <p:cNvPr id="61" name="Google Shape;61;p14"/>
+          <p:cNvSpPr txBox="1"/>
+          <p:nvPr>
+            <p:ph idx="1" type="body"/>
+          </p:nvPr>
+        </p:nvSpPr>
+        <p:spPr>
+          <a:xfrm>
+            <a:off x="311700" y="1152475"/>
+            <a:ext cx="8520600" cy="3420000"/>
+          </a:xfrm>
+          <a:prstGeom prst="rect">
+            <a:avLst/>
+          </a:prstGeom>
+        </p:spPr>
+        <p:txBody>
+          <a:bodyPr anchorCtr="0" anchor="t" bIns="91425" lIns="91425" spcFirstLastPara="1" rIns="91425" wrap="square" tIns="914400">
+            <a:normAutofit/>
+          </a:bodyPr>
+          <a:lstStyle/>
+          <a:p>
+            <a:pPr indent="-342900" lvl="0" marL="457200" rtl="0" algn="l">
+              <a:spcBef>
+                <a:spcPts val="0"/>
+              </a:spcBef>
+              <a:spcAft>
+                <a:spcPts val="0"/>
+              </a:spcAft>
+              <a:buSzPts val="1800"/>
+              <a:buChar char="●"/>
+            </a:pPr>
+            <a:r>
+              <a:rPr lang="en"/>
+              <a:t>Find recommended calorie intake based off of weight and </a:t>
+            </a:r>
+            <a:r>
+              <a:rPr lang="en" sz="1900"/>
+              <a:t>height</a:t>
+            </a:r>
+            <a:endParaRPr sz="1900"/>
+          </a:p>
+          <a:p>
+            <a:pPr indent="-349250" lvl="0" marL="457200" rtl="0" algn="l">
+              <a:spcBef>
+                <a:spcPts val="0"/>
+              </a:spcBef>
+              <a:spcAft>
+                <a:spcPts val="0"/>
+              </a:spcAft>
+              <a:buSzPts val="1900"/>
+              <a:buChar char="●"/>
+            </a:pPr>
+            <a:r>
+              <a:rPr lang="en" sz="1900"/>
+              <a:t>Keep track of user calorie intake by naming foods and their calorie count</a:t>
+            </a:r>
+            <a:endParaRPr sz="1900"/>
+          </a:p>
+          <a:p>
+            <a:pPr indent="-349250" lvl="0" marL="457200" rtl="0" algn="l">
+              <a:spcBef>
+                <a:spcPts val="0"/>
+              </a:spcBef>
+              <a:spcAft>
+                <a:spcPts val="0"/>
+              </a:spcAft>
+              <a:buSzPts val="1900"/>
+              <a:buChar char="●"/>
+            </a:pPr>
+            <a:r>
+              <a:rPr lang="en" sz="1900"/>
+              <a:t>Compare calorie intake recommendation to current calorie intake</a:t>
+            </a:r>
+            <a:endParaRPr sz="1900"/>
+          </a:p>
+        </p:txBody>
+      </p:sp>
+    </p:spTree>
+  </p:cSld>
+  <p:clrMapOvr>
+    <a:masterClrMapping/>
+  </p:clrMapOvr>
+</p:sld>
+</file>
+
+<file path=ppt/slides/slide3.xml><?xml version="1.0" encoding="utf-8"?>
+<p:sld xmlns:a="http://schemas.openxmlformats.org/drawingml/2006/main" xmlns:r="http://schemas.openxmlformats.org/officeDocument/2006/relationships" xmlns:mc="http://schemas.openxmlformats.org/markup-compatibility/2006" xmlns:mv="urn:schemas-microsoft-com:mac:vml" xmlns:p="http://schemas.openxmlformats.org/presentationml/2006/main" xmlns:c="http://schemas.openxmlformats.org/drawingml/2006/chart" xmlns:dgm="http://schemas.openxmlformats.org/drawingml/2006/diagram" xmlns:o="urn:schemas-microsoft-com:office:office" xmlns:v="urn:schemas-microsoft-com:vml" xmlns:pvml="urn:schemas-microsoft-com:office:powerpoint" xmlns:com="http://schemas.openxmlformats.org/drawingml/2006/compatibility" xmlns:p14="http://schemas.microsoft.com/office/powerpoint/2010/main" xmlns:p15="http://schemas.microsoft.com/office/powerpoint/2012/main" xmlns:ahyp="http://schemas.microsoft.com/office/drawing/2018/hyperlinkcolor">
+  <p:cSld>
+    <p:spTree>
+      <p:nvGrpSpPr>
+        <p:cNvPr id="65" name="Shape 65"/>
+        <p:cNvGrpSpPr/>
+        <p:nvPr/>
+      </p:nvGrpSpPr>
+      <p:grpSpPr>
+        <a:xfrm>
+          <a:off x="0" y="0"/>
+          <a:ext cx="0" cy="0"/>
+          <a:chOff x="0" y="0"/>
+          <a:chExt cx="0" cy="0"/>
+        </a:xfrm>
+      </p:grpSpPr>
+      <p:sp>
+        <p:nvSpPr>
+          <p:cNvPr id="66" name="Google Shape;66;p15"/>
+          <p:cNvSpPr txBox="1"/>
+          <p:nvPr>
+            <p:ph type="title"/>
+          </p:nvPr>
+        </p:nvSpPr>
+        <p:spPr>
+          <a:xfrm>
+            <a:off x="311700" y="445025"/>
+            <a:ext cx="8520600" cy="572700"/>
+          </a:xfrm>
+          <a:prstGeom prst="rect">
+            <a:avLst/>
+          </a:prstGeom>
+        </p:spPr>
+        <p:txBody>
+          <a:bodyPr anchorCtr="0" anchor="t" bIns="91425" lIns="91425" spcFirstLastPara="1" rIns="91425" wrap="square" tIns="91425">
+            <a:normAutofit fontScale="90000"/>
+          </a:bodyPr>
+          <a:lstStyle/>
+          <a:p>
+            <a:pPr indent="0" lvl="0" marL="0" rtl="0" algn="l">
+              <a:spcBef>
+                <a:spcPts val="0"/>
+              </a:spcBef>
+              <a:spcAft>
+                <a:spcPts val="0"/>
+              </a:spcAft>
+              <a:buNone/>
+            </a:pPr>
+            <a:r>
+              <a:rPr lang="en"/>
+              <a:t>Walk through app use</a:t>
+            </a:r>
+            <a:endParaRPr/>
+          </a:p>
+        </p:txBody>
+      </p:sp>
+      <p:sp>
+        <p:nvSpPr>
+          <p:cNvPr id="67" name="Google Shape;67;p15"/>
+          <p:cNvSpPr txBox="1"/>
+          <p:nvPr>
+            <p:ph idx="1" type="body"/>
+          </p:nvPr>
+        </p:nvSpPr>
+        <p:spPr>
+          <a:xfrm>
+            <a:off x="311700" y="1152475"/>
+            <a:ext cx="8520600" cy="3416400"/>
+          </a:xfrm>
+          <a:prstGeom prst="rect">
+            <a:avLst/>
+          </a:prstGeom>
+        </p:spPr>
+        <p:txBody>
+          <a:bodyPr anchorCtr="0" anchor="t" bIns="91425" lIns="91425" spcFirstLastPara="1" rIns="91425" wrap="square" tIns="91425">
+            <a:normAutofit/>
+          </a:bodyPr>
+          <a:lstStyle/>
+          <a:p>
+            <a:pPr indent="0" lvl="0" marL="0" rtl="0" algn="l">
+              <a:spcBef>
+                <a:spcPts val="0"/>
+              </a:spcBef>
+              <a:spcAft>
+                <a:spcPts val="0"/>
+              </a:spcAft>
+              <a:buNone/>
+            </a:pPr>
+            <a:r>
+              <a:rPr lang="en"/>
+              <a:t>To run the application, we need a couple of things installed before hand.</a:t>
+            </a:r>
+            <a:endParaRPr/>
+          </a:p>
+          <a:p>
+            <a:pPr indent="0" lvl="0" marL="0" rtl="0" algn="l">
+              <a:spcBef>
+                <a:spcPts val="1200"/>
+              </a:spcBef>
+              <a:spcAft>
+                <a:spcPts val="0"/>
+              </a:spcAft>
+              <a:buNone/>
+            </a:pPr>
+            <a:r>
+              <a:rPr lang="en"/>
+              <a:t>These are:</a:t>
+            </a:r>
+            <a:endParaRPr/>
+          </a:p>
+          <a:p>
+            <a:pPr indent="-342900" lvl="0" marL="457200" rtl="0" algn="l">
+              <a:spcBef>
+                <a:spcPts val="1200"/>
+              </a:spcBef>
+              <a:spcAft>
+                <a:spcPts val="0"/>
+              </a:spcAft>
+              <a:buSzPts val="1800"/>
+              <a:buChar char="●"/>
+            </a:pPr>
+            <a:r>
+              <a:rPr lang="en"/>
+              <a:t>Python3</a:t>
+            </a:r>
+            <a:endParaRPr/>
+          </a:p>
+          <a:p>
+            <a:pPr indent="-342900" lvl="0" marL="457200" rtl="0" algn="l">
+              <a:spcBef>
+                <a:spcPts val="0"/>
+              </a:spcBef>
+              <a:spcAft>
+                <a:spcPts val="0"/>
+              </a:spcAft>
+              <a:buSzPts val="1800"/>
+              <a:buChar char="●"/>
+            </a:pPr>
+            <a:r>
+              <a:rPr lang="en"/>
+              <a:t>Package: pandas</a:t>
+            </a:r>
+            <a:endParaRPr/>
+          </a:p>
+          <a:p>
+            <a:pPr indent="-342900" lvl="0" marL="457200" rtl="0" algn="l">
+              <a:spcBef>
+                <a:spcPts val="0"/>
+              </a:spcBef>
+              <a:spcAft>
+                <a:spcPts val="0"/>
+              </a:spcAft>
+              <a:buSzPts val="1800"/>
+              <a:buChar char="●"/>
+            </a:pPr>
+            <a:r>
+              <a:rPr lang="en"/>
+              <a:t>Package: curses</a:t>
+            </a:r>
+            <a:endParaRPr/>
+          </a:p>
+        </p:txBody>
+      </p:sp>
+    </p:spTree>
+  </p:cSld>
+  <p:clrMapOvr>
+    <a:masterClrMapping/>
+  </p:clrMapOvr>
+</p:sld>
+</file>
+
+<file path=ppt/slides/slide4.xml><?xml version="1.0" encoding="utf-8"?>
+<p:sld xmlns:a="http://schemas.openxmlformats.org/drawingml/2006/main" xmlns:r="http://schemas.openxmlformats.org/officeDocument/2006/relationships" xmlns:mc="http://schemas.openxmlformats.org/markup-compatibility/2006" xmlns:mv="urn:schemas-microsoft-com:mac:vml" xmlns:p="http://schemas.openxmlformats.org/presentationml/2006/main" xmlns:c="http://schemas.openxmlformats.org/drawingml/2006/chart" xmlns:dgm="http://schemas.openxmlformats.org/drawingml/2006/diagram" xmlns:o="urn:schemas-microsoft-com:office:office" xmlns:v="urn:schemas-microsoft-com:vml" xmlns:pvml="urn:schemas-microsoft-com:office:powerpoint" xmlns:com="http://schemas.openxmlformats.org/drawingml/2006/compatibility" xmlns:p14="http://schemas.microsoft.com/office/powerpoint/2010/main" xmlns:p15="http://schemas.microsoft.com/office/powerpoint/2012/main" xmlns:ahyp="http://schemas.microsoft.com/office/drawing/2018/hyperlinkcolor">
+  <p:cSld>
+    <p:spTree>
+      <p:nvGrpSpPr>
+        <p:cNvPr id="71" name="Shape 71"/>
+        <p:cNvGrpSpPr/>
+        <p:nvPr/>
+      </p:nvGrpSpPr>
+      <p:grpSpPr>
+        <a:xfrm>
+          <a:off x="0" y="0"/>
+          <a:ext cx="0" cy="0"/>
+          <a:chOff x="0" y="0"/>
+          <a:chExt cx="0" cy="0"/>
+        </a:xfrm>
+      </p:grpSpPr>
+      <p:sp>
+        <p:nvSpPr>
+          <p:cNvPr id="72" name="Google Shape;72;p16"/>
+          <p:cNvSpPr txBox="1"/>
+          <p:nvPr>
+            <p:ph type="title"/>
+          </p:nvPr>
+        </p:nvSpPr>
+        <p:spPr>
+          <a:xfrm>
+            <a:off x="311700" y="445025"/>
+            <a:ext cx="8520600" cy="572700"/>
+          </a:xfrm>
+          <a:prstGeom prst="rect">
+            <a:avLst/>
+          </a:prstGeom>
+        </p:spPr>
+        <p:txBody>
+          <a:bodyPr anchorCtr="0" anchor="t" bIns="91425" lIns="91425" spcFirstLastPara="1" rIns="91425" wrap="square" tIns="91425">
+            <a:normAutofit fontScale="90000"/>
+          </a:bodyPr>
+          <a:lstStyle/>
+          <a:p>
+            <a:pPr indent="0" lvl="0" marL="0" rtl="0" algn="l">
+              <a:spcBef>
+                <a:spcPts val="0"/>
+              </a:spcBef>
+              <a:spcAft>
+                <a:spcPts val="0"/>
+              </a:spcAft>
+              <a:buNone/>
+            </a:pPr>
+            <a:r>
+              <a:rPr lang="en"/>
+              <a:t>Running shell script</a:t>
+            </a:r>
+            <a:endParaRPr/>
+          </a:p>
+        </p:txBody>
+      </p:sp>
+      <p:sp>
+        <p:nvSpPr>
+          <p:cNvPr id="73" name="Google Shape;73;p16"/>
+          <p:cNvSpPr txBox="1"/>
+          <p:nvPr>
+            <p:ph idx="1" type="body"/>
+          </p:nvPr>
+        </p:nvSpPr>
+        <p:spPr>
+          <a:xfrm>
+            <a:off x="311700" y="1152475"/>
+            <a:ext cx="8520600" cy="3416400"/>
+          </a:xfrm>
+          <a:prstGeom prst="rect">
+            <a:avLst/>
+          </a:prstGeom>
+        </p:spPr>
+        <p:txBody>
+          <a:bodyPr anchorCtr="0" anchor="t" bIns="91425" lIns="91425" spcFirstLastPara="1" rIns="91425" wrap="square" tIns="91425">
+            <a:normAutofit/>
+          </a:bodyPr>
+          <a:lstStyle/>
+          <a:p>
+            <a:pPr indent="0" lvl="0" marL="0" rtl="0" algn="l">
+              <a:spcBef>
+                <a:spcPts val="0"/>
+              </a:spcBef>
+              <a:spcAft>
+                <a:spcPts val="0"/>
+              </a:spcAft>
+              <a:buNone/>
+            </a:pPr>
+            <a:r>
+              <a:rPr lang="en"/>
+              <a:t>To give the shell script permission to run (on bash), type: </a:t>
+            </a:r>
+            <a:endParaRPr/>
+          </a:p>
+          <a:p>
+            <a:pPr indent="0" lvl="0" marL="0" rtl="0" algn="l">
+              <a:spcBef>
+                <a:spcPts val="1200"/>
+              </a:spcBef>
+              <a:spcAft>
+                <a:spcPts val="0"/>
+              </a:spcAft>
+              <a:buNone/>
+            </a:pPr>
+            <a:r>
+              <a:rPr lang="en"/>
+              <a:t>	</a:t>
+            </a:r>
+            <a:r>
+              <a:rPr lang="en">
+                <a:latin typeface="Consolas"/>
+                <a:ea typeface="Consolas"/>
+                <a:cs typeface="Consolas"/>
+                <a:sym typeface="Consolas"/>
+              </a:rPr>
+              <a:t>chmod +x script.sh</a:t>
+            </a:r>
+            <a:endParaRPr>
+              <a:latin typeface="Consolas"/>
+              <a:ea typeface="Consolas"/>
+              <a:cs typeface="Consolas"/>
+              <a:sym typeface="Consolas"/>
+            </a:endParaRPr>
+          </a:p>
+          <a:p>
+            <a:pPr indent="0" lvl="0" marL="0" rtl="0" algn="l">
+              <a:spcBef>
+                <a:spcPts val="1200"/>
+              </a:spcBef>
+              <a:spcAft>
+                <a:spcPts val="0"/>
+              </a:spcAft>
+              <a:buNone/>
+            </a:pPr>
+            <a:r>
+              <a:rPr lang="en"/>
+              <a:t>in your terminal when in the assignment directory.</a:t>
+            </a:r>
+            <a:br>
+              <a:rPr lang="en"/>
+            </a:br>
+            <a:r>
+              <a:rPr lang="en"/>
+              <a:t>Then type:</a:t>
+            </a:r>
+            <a:endParaRPr/>
+          </a:p>
+          <a:p>
+            <a:pPr indent="0" lvl="0" marL="0" rtl="0" algn="l">
+              <a:spcBef>
+                <a:spcPts val="1200"/>
+              </a:spcBef>
+              <a:spcAft>
+                <a:spcPts val="0"/>
+              </a:spcAft>
+              <a:buNone/>
+            </a:pPr>
+            <a:r>
+              <a:rPr lang="en"/>
+              <a:t>	</a:t>
+            </a:r>
+            <a:r>
+              <a:rPr lang="en">
+                <a:latin typeface="Consolas"/>
+                <a:ea typeface="Consolas"/>
+                <a:cs typeface="Consolas"/>
+                <a:sym typeface="Consolas"/>
+              </a:rPr>
+              <a:t>./script.sh</a:t>
+            </a:r>
+            <a:endParaRPr>
+              <a:latin typeface="Consolas"/>
+              <a:ea typeface="Consolas"/>
+              <a:cs typeface="Consolas"/>
+              <a:sym typeface="Consolas"/>
+            </a:endParaRPr>
+          </a:p>
+          <a:p>
+            <a:pPr indent="0" lvl="0" marL="0" rtl="0" algn="l">
+              <a:spcBef>
+                <a:spcPts val="1200"/>
+              </a:spcBef>
+              <a:spcAft>
+                <a:spcPts val="0"/>
+              </a:spcAft>
+              <a:buNone/>
+            </a:pPr>
+            <a:r>
+              <a:rPr lang="en"/>
+              <a:t>to</a:t>
+            </a:r>
+            <a:r>
+              <a:rPr lang="en"/>
+              <a:t> run the calorie tracker app.</a:t>
+            </a:r>
+            <a:endParaRPr/>
+          </a:p>
+          <a:p>
+            <a:pPr indent="0" lvl="0" marL="0" rtl="0" algn="l">
+              <a:spcBef>
+                <a:spcPts val="1200"/>
+              </a:spcBef>
+              <a:spcAft>
+                <a:spcPts val="1200"/>
+              </a:spcAft>
+              <a:buNone/>
+            </a:pPr>
+            <a:r>
+              <a:t/>
+            </a:r>
+            <a:endParaRPr/>
+          </a:p>
+        </p:txBody>
+      </p:sp>
+    </p:spTree>
+  </p:cSld>
+  <p:clrMapOvr>
+    <a:masterClrMapping/>
+  </p:clrMapOvr>
+</p:sld>
+</file>
+
+<file path=ppt/slides/slide5.xml><?xml version="1.0" encoding="utf-8"?>
+<p:sld xmlns:a="http://schemas.openxmlformats.org/drawingml/2006/main" xmlns:r="http://schemas.openxmlformats.org/officeDocument/2006/relationships" xmlns:mc="http://schemas.openxmlformats.org/markup-compatibility/2006" xmlns:mv="urn:schemas-microsoft-com:mac:vml" xmlns:p="http://schemas.openxmlformats.org/presentationml/2006/main" xmlns:c="http://schemas.openxmlformats.org/drawingml/2006/chart" xmlns:dgm="http://schemas.openxmlformats.org/drawingml/2006/diagram" xmlns:o="urn:schemas-microsoft-com:office:office" xmlns:v="urn:schemas-microsoft-com:vml" xmlns:pvml="urn:schemas-microsoft-com:office:powerpoint" xmlns:com="http://schemas.openxmlformats.org/drawingml/2006/compatibility" xmlns:p14="http://schemas.microsoft.com/office/powerpoint/2010/main" xmlns:p15="http://schemas.microsoft.com/office/powerpoint/2012/main" xmlns:ahyp="http://schemas.microsoft.com/office/drawing/2018/hyperlinkcolor">
+  <p:cSld>
+    <p:spTree>
+      <p:nvGrpSpPr>
+        <p:cNvPr id="77" name="Shape 77"/>
+        <p:cNvGrpSpPr/>
+        <p:nvPr/>
+      </p:nvGrpSpPr>
+      <p:grpSpPr>
+        <a:xfrm>
+          <a:off x="0" y="0"/>
+          <a:ext cx="0" cy="0"/>
+          <a:chOff x="0" y="0"/>
+          <a:chExt cx="0" cy="0"/>
+        </a:xfrm>
+      </p:grpSpPr>
+      <p:sp>
+        <p:nvSpPr>
+          <p:cNvPr id="78" name="Google Shape;78;p17"/>
+          <p:cNvSpPr txBox="1"/>
+          <p:nvPr>
+            <p:ph type="title"/>
+          </p:nvPr>
+        </p:nvSpPr>
+        <p:spPr>
+          <a:xfrm>
+            <a:off x="311700" y="445025"/>
+            <a:ext cx="8520600" cy="572700"/>
+          </a:xfrm>
+          <a:prstGeom prst="rect">
+            <a:avLst/>
+          </a:prstGeom>
+        </p:spPr>
+        <p:txBody>
+          <a:bodyPr anchorCtr="0" anchor="t" bIns="91425" lIns="91425" spcFirstLastPara="1" rIns="91425" wrap="square" tIns="91425">
+            <a:normAutofit fontScale="90000"/>
+          </a:bodyPr>
+          <a:lstStyle/>
+          <a:p>
+            <a:pPr indent="0" lvl="0" marL="0" rtl="0" algn="l">
+              <a:spcBef>
+                <a:spcPts val="0"/>
+              </a:spcBef>
+              <a:spcAft>
+                <a:spcPts val="0"/>
+              </a:spcAft>
+              <a:buNone/>
+            </a:pPr>
+            <a:r>
+              <a:rPr lang="en"/>
+              <a:t>Using the Calorie Tracker</a:t>
+            </a:r>
+            <a:endParaRPr/>
+          </a:p>
+        </p:txBody>
+      </p:sp>
+      <p:sp>
+        <p:nvSpPr>
+          <p:cNvPr id="79" name="Google Shape;79;p17"/>
+          <p:cNvSpPr txBox="1"/>
+          <p:nvPr>
+            <p:ph idx="1" type="body"/>
+          </p:nvPr>
+        </p:nvSpPr>
+        <p:spPr>
+          <a:xfrm>
+            <a:off x="311700" y="1152475"/>
+            <a:ext cx="8520600" cy="3416400"/>
+          </a:xfrm>
+          <a:prstGeom prst="rect">
+            <a:avLst/>
+          </a:prstGeom>
+        </p:spPr>
+        <p:txBody>
+          <a:bodyPr anchorCtr="0" anchor="t" bIns="91425" lIns="91425" spcFirstLastPara="1" rIns="91425" wrap="square" tIns="91425">
+            <a:normAutofit/>
+          </a:bodyPr>
+          <a:lstStyle/>
+          <a:p>
+            <a:pPr indent="0" lvl="0" marL="0" rtl="0" algn="l">
+              <a:spcBef>
+                <a:spcPts val="0"/>
+              </a:spcBef>
+              <a:spcAft>
+                <a:spcPts val="0"/>
+              </a:spcAft>
+              <a:buNone/>
+            </a:pPr>
+            <a:r>
+              <a:rPr lang="en"/>
+              <a:t>Upon running the app, you are greeted and prompted to enter your weight and height. You are subsequently given your recommended calorie intake. </a:t>
+            </a:r>
+            <a:endParaRPr/>
+          </a:p>
+          <a:p>
+            <a:pPr indent="0" lvl="0" marL="0" rtl="0" algn="l">
+              <a:spcBef>
+                <a:spcPts val="1200"/>
+              </a:spcBef>
+              <a:spcAft>
+                <a:spcPts val="0"/>
+              </a:spcAft>
+              <a:buNone/>
+            </a:pPr>
+            <a:r>
+              <a:rPr lang="en"/>
+              <a:t>The user is given some text indicating they can type commands now! The text is as follows</a:t>
+            </a:r>
+            <a:endParaRPr/>
+          </a:p>
+          <a:p>
+            <a:pPr indent="457200" lvl="0" marL="0" rtl="0" algn="l">
+              <a:spcBef>
+                <a:spcPts val="1200"/>
+              </a:spcBef>
+              <a:spcAft>
+                <a:spcPts val="0"/>
+              </a:spcAft>
+              <a:buNone/>
+            </a:pPr>
+            <a:r>
+              <a:rPr lang="en">
+                <a:latin typeface="Consolas"/>
+                <a:ea typeface="Consolas"/>
+                <a:cs typeface="Consolas"/>
+                <a:sym typeface="Consolas"/>
+              </a:rPr>
+              <a:t>type ‘help’ to get list of commands</a:t>
+            </a:r>
+            <a:endParaRPr/>
+          </a:p>
+          <a:p>
+            <a:pPr indent="0" lvl="0" marL="0" rtl="0" algn="l">
+              <a:spcBef>
+                <a:spcPts val="1200"/>
+              </a:spcBef>
+              <a:spcAft>
+                <a:spcPts val="0"/>
+              </a:spcAft>
+              <a:buNone/>
+            </a:pPr>
+            <a:r>
+              <a:rPr lang="en"/>
+              <a:t>Now you are left with a place to input commands, indicated by the arrow ‘&gt;’</a:t>
+            </a:r>
+            <a:endParaRPr/>
+          </a:p>
+          <a:p>
+            <a:pPr indent="0" lvl="0" marL="0" rtl="0" algn="l">
+              <a:spcBef>
+                <a:spcPts val="1200"/>
+              </a:spcBef>
+              <a:spcAft>
+                <a:spcPts val="1200"/>
+              </a:spcAft>
+              <a:buNone/>
+            </a:pPr>
+            <a:r>
+              <a:rPr lang="en"/>
+              <a:t> </a:t>
+            </a:r>
+            <a:endParaRPr/>
+          </a:p>
+        </p:txBody>
+      </p:sp>
+    </p:spTree>
+  </p:cSld>
+  <p:clrMapOvr>
+    <a:masterClrMapping/>
+  </p:clrMapOvr>
+</p:sld>
+</file>
+
+<file path=ppt/slides/slide6.xml><?xml version="1.0" encoding="utf-8"?>
+<p:sld xmlns:a="http://schemas.openxmlformats.org/drawingml/2006/main" xmlns:r="http://schemas.openxmlformats.org/officeDocument/2006/relationships" xmlns:mc="http://schemas.openxmlformats.org/markup-compatibility/2006" xmlns:mv="urn:schemas-microsoft-com:mac:vml" xmlns:p="http://schemas.openxmlformats.org/presentationml/2006/main" xmlns:c="http://schemas.openxmlformats.org/drawingml/2006/chart" xmlns:dgm="http://schemas.openxmlformats.org/drawingml/2006/diagram" xmlns:o="urn:schemas-microsoft-com:office:office" xmlns:v="urn:schemas-microsoft-com:vml" xmlns:pvml="urn:schemas-microsoft-com:office:powerpoint" xmlns:com="http://schemas.openxmlformats.org/drawingml/2006/compatibility" xmlns:p14="http://schemas.microsoft.com/office/powerpoint/2010/main" xmlns:p15="http://schemas.microsoft.com/office/powerpoint/2012/main" xmlns:ahyp="http://schemas.microsoft.com/office/drawing/2018/hyperlinkcolor">
+  <p:cSld>
+    <p:spTree>
+      <p:nvGrpSpPr>
+        <p:cNvPr id="83" name="Shape 83"/>
+        <p:cNvGrpSpPr/>
+        <p:nvPr/>
+      </p:nvGrpSpPr>
+      <p:grpSpPr>
+        <a:xfrm>
+          <a:off x="0" y="0"/>
+          <a:ext cx="0" cy="0"/>
+          <a:chOff x="0" y="0"/>
+          <a:chExt cx="0" cy="0"/>
+        </a:xfrm>
+      </p:grpSpPr>
+      <p:sp>
+        <p:nvSpPr>
+          <p:cNvPr id="84" name="Google Shape;84;p18"/>
+          <p:cNvSpPr txBox="1"/>
+          <p:nvPr>
+            <p:ph type="title"/>
+          </p:nvPr>
+        </p:nvSpPr>
+        <p:spPr>
+          <a:xfrm>
+            <a:off x="311700" y="445025"/>
+            <a:ext cx="8520600" cy="572700"/>
+          </a:xfrm>
+          <a:prstGeom prst="rect">
+            <a:avLst/>
+          </a:prstGeom>
+        </p:spPr>
+        <p:txBody>
+          <a:bodyPr anchorCtr="0" anchor="t" bIns="91425" lIns="91425" spcFirstLastPara="1" rIns="91425" wrap="square" tIns="91425">
+            <a:normAutofit fontScale="90000"/>
+          </a:bodyPr>
+          <a:lstStyle/>
+          <a:p>
+            <a:pPr indent="0" lvl="0" marL="0" rtl="0" algn="l">
+              <a:spcBef>
+                <a:spcPts val="0"/>
+              </a:spcBef>
+              <a:spcAft>
+                <a:spcPts val="0"/>
+              </a:spcAft>
+              <a:buNone/>
+            </a:pPr>
+            <a:r>
+              <a:rPr lang="en"/>
+              <a:t>Using the Calorie Tracker</a:t>
+            </a:r>
+            <a:endParaRPr/>
+          </a:p>
+        </p:txBody>
+      </p:sp>
+      <p:sp>
+        <p:nvSpPr>
+          <p:cNvPr id="85" name="Google Shape;85;p18"/>
+          <p:cNvSpPr txBox="1"/>
+          <p:nvPr>
+            <p:ph idx="1" type="body"/>
+          </p:nvPr>
+        </p:nvSpPr>
+        <p:spPr>
+          <a:xfrm>
+            <a:off x="311700" y="1152475"/>
+            <a:ext cx="8520600" cy="3416400"/>
+          </a:xfrm>
+          <a:prstGeom prst="rect">
+            <a:avLst/>
+          </a:prstGeom>
+        </p:spPr>
+        <p:txBody>
+          <a:bodyPr anchorCtr="0" anchor="t" bIns="91425" lIns="91425" spcFirstLastPara="1" rIns="91425" wrap="square" tIns="91425">
+            <a:normAutofit/>
+          </a:bodyPr>
+          <a:lstStyle/>
+          <a:p>
+            <a:pPr indent="0" lvl="0" marL="0" rtl="0" algn="l">
+              <a:spcBef>
+                <a:spcPts val="0"/>
+              </a:spcBef>
+              <a:spcAft>
+                <a:spcPts val="0"/>
+              </a:spcAft>
+              <a:buNone/>
+            </a:pPr>
+            <a:r>
+              <a:rPr lang="en"/>
+              <a:t>When typing </a:t>
+            </a:r>
+            <a:r>
+              <a:rPr lang="en">
+                <a:latin typeface="Consolas"/>
+                <a:ea typeface="Consolas"/>
+                <a:cs typeface="Consolas"/>
+                <a:sym typeface="Consolas"/>
+              </a:rPr>
+              <a:t>‘</a:t>
+            </a:r>
+            <a:r>
+              <a:rPr lang="en">
+                <a:latin typeface="Consolas"/>
+                <a:ea typeface="Consolas"/>
+                <a:cs typeface="Consolas"/>
+                <a:sym typeface="Consolas"/>
+              </a:rPr>
+              <a:t>help’ </a:t>
+            </a:r>
+            <a:r>
+              <a:rPr lang="en"/>
+              <a:t>the list of available commands are shown. The most useful of these are </a:t>
+            </a:r>
+            <a:r>
+              <a:rPr lang="en">
+                <a:latin typeface="Consolas"/>
+                <a:ea typeface="Consolas"/>
+                <a:cs typeface="Consolas"/>
+                <a:sym typeface="Consolas"/>
+              </a:rPr>
+              <a:t>‘meal’</a:t>
+            </a:r>
+            <a:r>
+              <a:rPr lang="en"/>
+              <a:t>,</a:t>
+            </a:r>
+            <a:r>
+              <a:rPr lang="en">
+                <a:latin typeface="Consolas"/>
+                <a:ea typeface="Consolas"/>
+                <a:cs typeface="Consolas"/>
+                <a:sym typeface="Consolas"/>
+              </a:rPr>
+              <a:t> ‘info’</a:t>
+            </a:r>
+            <a:r>
+              <a:rPr lang="en"/>
+              <a:t> and </a:t>
+            </a:r>
+            <a:r>
+              <a:rPr lang="en">
+                <a:latin typeface="Consolas"/>
+                <a:ea typeface="Consolas"/>
+                <a:cs typeface="Consolas"/>
+                <a:sym typeface="Consolas"/>
+              </a:rPr>
+              <a:t>‘quit’</a:t>
+            </a:r>
+            <a:endParaRPr>
+              <a:latin typeface="Consolas"/>
+              <a:ea typeface="Consolas"/>
+              <a:cs typeface="Consolas"/>
+              <a:sym typeface="Consolas"/>
+            </a:endParaRPr>
+          </a:p>
+          <a:p>
+            <a:pPr indent="-342900" lvl="0" marL="457200" rtl="0" algn="l">
+              <a:spcBef>
+                <a:spcPts val="1200"/>
+              </a:spcBef>
+              <a:spcAft>
+                <a:spcPts val="0"/>
+              </a:spcAft>
+              <a:buSzPts val="1800"/>
+              <a:buChar char="●"/>
+            </a:pPr>
+            <a:r>
+              <a:rPr lang="en">
+                <a:latin typeface="Consolas"/>
+                <a:ea typeface="Consolas"/>
+                <a:cs typeface="Consolas"/>
+                <a:sym typeface="Consolas"/>
+              </a:rPr>
+              <a:t>‘meal’</a:t>
+            </a:r>
+            <a:r>
+              <a:rPr lang="en"/>
+              <a:t> lets you add a meal and prompts you to write the meal name and the amount of calories it has</a:t>
+            </a:r>
+            <a:endParaRPr/>
+          </a:p>
+          <a:p>
+            <a:pPr indent="-342900" lvl="0" marL="457200" rtl="0" algn="l">
+              <a:spcBef>
+                <a:spcPts val="0"/>
+              </a:spcBef>
+              <a:spcAft>
+                <a:spcPts val="0"/>
+              </a:spcAft>
+              <a:buSzPts val="1800"/>
+              <a:buChar char="●"/>
+            </a:pPr>
+            <a:r>
+              <a:rPr lang="en">
+                <a:latin typeface="Consolas"/>
+                <a:ea typeface="Consolas"/>
+                <a:cs typeface="Consolas"/>
+                <a:sym typeface="Consolas"/>
+              </a:rPr>
+              <a:t>‘info’</a:t>
+            </a:r>
+            <a:r>
+              <a:rPr lang="en"/>
+              <a:t> gives you a bunch of information including recommended calories, current calories, user weight and user height</a:t>
+            </a:r>
+            <a:endParaRPr/>
+          </a:p>
+          <a:p>
+            <a:pPr indent="-342900" lvl="0" marL="457200" rtl="0" algn="l">
+              <a:spcBef>
+                <a:spcPts val="0"/>
+              </a:spcBef>
+              <a:spcAft>
+                <a:spcPts val="0"/>
+              </a:spcAft>
+              <a:buSzPts val="1800"/>
+              <a:buChar char="●"/>
+            </a:pPr>
+            <a:r>
+              <a:rPr lang="en">
+                <a:latin typeface="Consolas"/>
+                <a:ea typeface="Consolas"/>
+                <a:cs typeface="Consolas"/>
+                <a:sym typeface="Consolas"/>
+              </a:rPr>
+              <a:t>‘Quit’</a:t>
+            </a:r>
+            <a:r>
+              <a:rPr lang="en"/>
+              <a:t> allows you to exit the program</a:t>
+            </a:r>
+            <a:endParaRPr/>
+          </a:p>
+          <a:p>
+            <a:pPr indent="0" lvl="0" marL="0" rtl="0" algn="l">
+              <a:spcBef>
+                <a:spcPts val="1200"/>
+              </a:spcBef>
+              <a:spcAft>
+                <a:spcPts val="1200"/>
+              </a:spcAft>
+              <a:buNone/>
+            </a:pPr>
+            <a:r>
+              <a:rPr lang="en"/>
+              <a:t>There are much more commands that can be covered</a:t>
+            </a:r>
+            <a:endParaRPr/>
+          </a:p>
+        </p:txBody>
+      </p:sp>
+    </p:spTree>
+  </p:cSld>
+  <p:clrMapOvr>
+    <a:masterClrMapping/>
+  </p:clrMapOvr>
+</p:sld>
+</file>
+
+<file path=ppt/slides/slide7.xml><?xml version="1.0" encoding="utf-8"?>
+<p:sld xmlns:a="http://schemas.openxmlformats.org/drawingml/2006/main" xmlns:r="http://schemas.openxmlformats.org/officeDocument/2006/relationships" xmlns:mc="http://schemas.openxmlformats.org/markup-compatibility/2006" xmlns:mv="urn:schemas-microsoft-com:mac:vml" xmlns:p="http://schemas.openxmlformats.org/presentationml/2006/main" xmlns:c="http://schemas.openxmlformats.org/drawingml/2006/chart" xmlns:dgm="http://schemas.openxmlformats.org/drawingml/2006/diagram" xmlns:o="urn:schemas-microsoft-com:office:office" xmlns:v="urn:schemas-microsoft-com:vml" xmlns:pvml="urn:schemas-microsoft-com:office:powerpoint" xmlns:com="http://schemas.openxmlformats.org/drawingml/2006/compatibility" xmlns:p14="http://schemas.microsoft.com/office/powerpoint/2010/main" xmlns:p15="http://schemas.microsoft.com/office/powerpoint/2012/main" xmlns:ahyp="http://schemas.microsoft.com/office/drawing/2018/hyperlinkcolor">
+  <p:cSld>
+    <p:spTree>
+      <p:nvGrpSpPr>
+        <p:cNvPr id="89" name="Shape 89"/>
+        <p:cNvGrpSpPr/>
+        <p:nvPr/>
+      </p:nvGrpSpPr>
+      <p:grpSpPr>
+        <a:xfrm>
+          <a:off x="0" y="0"/>
+          <a:ext cx="0" cy="0"/>
+          <a:chOff x="0" y="0"/>
+          <a:chExt cx="0" cy="0"/>
+        </a:xfrm>
+      </p:grpSpPr>
+      <p:sp>
+        <p:nvSpPr>
+          <p:cNvPr id="90" name="Google Shape;90;p19"/>
+          <p:cNvSpPr txBox="1"/>
+          <p:nvPr>
+            <p:ph type="title"/>
+          </p:nvPr>
+        </p:nvSpPr>
+        <p:spPr>
+          <a:xfrm>
+            <a:off x="311700" y="2150850"/>
+            <a:ext cx="8520600" cy="841800"/>
+          </a:xfrm>
+          <a:prstGeom prst="rect">
+            <a:avLst/>
+          </a:prstGeom>
+        </p:spPr>
+        <p:txBody>
+          <a:bodyPr anchorCtr="0" anchor="ctr" bIns="91425" lIns="91425" spcFirstLastPara="1" rIns="91425" wrap="square" tIns="91425">
+            <a:normAutofit/>
+          </a:bodyPr>
+          <a:lstStyle/>
+          <a:p>
+            <a:pPr indent="0" lvl="0" marL="0" rtl="0" algn="ctr">
+              <a:spcBef>
+                <a:spcPts val="0"/>
+              </a:spcBef>
+              <a:spcAft>
+                <a:spcPts val="0"/>
+              </a:spcAft>
+              <a:buNone/>
+            </a:pPr>
+            <a:r>
+              <a:rPr lang="en"/>
+              <a:t>Other commands!</a:t>
+            </a:r>
+            <a:endParaRPr/>
+          </a:p>
+        </p:txBody>
+      </p:sp>
+    </p:spTree>
+  </p:cSld>
+  <p:clrMapOvr>
+    <a:masterClrMapping/>
+  </p:clrMapOvr>
+</p:sld>
+</file>
+
+<file path=ppt/slides/slide8.xml><?xml version="1.0" encoding="utf-8"?>
+<p:sld xmlns:a="http://schemas.openxmlformats.org/drawingml/2006/main" xmlns:r="http://schemas.openxmlformats.org/officeDocument/2006/relationships" xmlns:mc="http://schemas.openxmlformats.org/markup-compatibility/2006" xmlns:mv="urn:schemas-microsoft-com:mac:vml" xmlns:p="http://schemas.openxmlformats.org/presentationml/2006/main" xmlns:c="http://schemas.openxmlformats.org/drawingml/2006/chart" xmlns:dgm="http://schemas.openxmlformats.org/drawingml/2006/diagram" xmlns:o="urn:schemas-microsoft-com:office:office" xmlns:v="urn:schemas-microsoft-com:vml" xmlns:pvml="urn:schemas-microsoft-com:office:powerpoint" xmlns:com="http://schemas.openxmlformats.org/drawingml/2006/compatibility" xmlns:p14="http://schemas.microsoft.com/office/powerpoint/2010/main" xmlns:p15="http://schemas.microsoft.com/office/powerpoint/2012/main" xmlns:ahyp="http://schemas.microsoft.com/office/drawing/2018/hyperlinkcolor">
+  <p:cSld>
+    <p:spTree>
+      <p:nvGrpSpPr>
+        <p:cNvPr id="94" name="Shape 94"/>
+        <p:cNvGrpSpPr/>
+        <p:nvPr/>
+      </p:nvGrpSpPr>
+      <p:grpSpPr>
+        <a:xfrm>
+          <a:off x="0" y="0"/>
+          <a:ext cx="0" cy="0"/>
+          <a:chOff x="0" y="0"/>
+          <a:chExt cx="0" cy="0"/>
+        </a:xfrm>
+      </p:grpSpPr>
+      <p:sp>
+        <p:nvSpPr>
+          <p:cNvPr id="95" name="Google Shape;95;p20"/>
+          <p:cNvSpPr txBox="1"/>
+          <p:nvPr>
+            <p:ph type="title"/>
+          </p:nvPr>
+        </p:nvSpPr>
+        <p:spPr>
+          <a:xfrm>
+            <a:off x="311700" y="2150850"/>
+            <a:ext cx="8520600" cy="841800"/>
+          </a:xfrm>
+          <a:prstGeom prst="rect">
+            <a:avLst/>
+          </a:prstGeom>
+        </p:spPr>
+        <p:txBody>
+          <a:bodyPr anchorCtr="0" anchor="ctr" bIns="91425" lIns="91425" spcFirstLastPara="1" rIns="91425" wrap="square" tIns="91425">
+            <a:normAutofit/>
+          </a:bodyPr>
+          <a:lstStyle/>
+          <a:p>
+            <a:pPr indent="0" lvl="0" marL="0" rtl="0" algn="ctr">
+              <a:spcBef>
+                <a:spcPts val="0"/>
+              </a:spcBef>
+              <a:spcAft>
+                <a:spcPts val="0"/>
+              </a:spcAft>
+              <a:buNone/>
+            </a:pPr>
+            <a:r>
+              <a:rPr lang="en"/>
+              <a:t>How I did it!</a:t>
+            </a:r>
+            <a:endParaRPr/>
+          </a:p>
+        </p:txBody>
+      </p:sp>
+    </p:spTree>
+  </p:cSld>
+  <p:clrMapOvr>
+    <a:masterClrMapping/>
+  </p:clrMapOvr>
+</p:sld>
+</file>
+
+<file path=ppt/slides/slide9.xml><?xml version="1.0" encoding="utf-8"?>
+<p:sld xmlns:a="http://schemas.openxmlformats.org/drawingml/2006/main" xmlns:r="http://schemas.openxmlformats.org/officeDocument/2006/relationships" xmlns:mc="http://schemas.openxmlformats.org/markup-compatibility/2006" xmlns:mv="urn:schemas-microsoft-com:mac:vml" xmlns:p="http://schemas.openxmlformats.org/presentationml/2006/main" xmlns:c="http://schemas.openxmlformats.org/drawingml/2006/chart" xmlns:dgm="http://schemas.openxmlformats.org/drawingml/2006/diagram" xmlns:o="urn:schemas-microsoft-com:office:office" xmlns:v="urn:schemas-microsoft-com:vml" xmlns:pvml="urn:schemas-microsoft-com:office:powerpoint" xmlns:com="http://schemas.openxmlformats.org/drawingml/2006/compatibility" xmlns:p14="http://schemas.microsoft.com/office/powerpoint/2010/main" xmlns:p15="http://schemas.microsoft.com/office/powerpoint/2012/main" xmlns:ahyp="http://schemas.microsoft.com/office/drawing/2018/hyperlinkcolor">
+  <p:cSld>
+    <p:spTree>
+      <p:nvGrpSpPr>
+        <p:cNvPr id="99" name="Shape 99"/>
+        <p:cNvGrpSpPr/>
+        <p:nvPr/>
+      </p:nvGrpSpPr>
+      <p:grpSpPr>
+        <a:xfrm>
+          <a:off x="0" y="0"/>
+          <a:ext cx="0" cy="0"/>
+          <a:chOff x="0" y="0"/>
+          <a:chExt cx="0" cy="0"/>
+        </a:xfrm>
+      </p:grpSpPr>
+      <p:sp>
+        <p:nvSpPr>
+          <p:cNvPr id="100" name="Google Shape;100;p21"/>
+          <p:cNvSpPr txBox="1"/>
+          <p:nvPr>
+            <p:ph type="title"/>
+          </p:nvPr>
+        </p:nvSpPr>
+        <p:spPr>
+          <a:xfrm>
+            <a:off x="311700" y="2150850"/>
+            <a:ext cx="8520600" cy="841800"/>
+          </a:xfrm>
+          <a:prstGeom prst="rect">
+            <a:avLst/>
+          </a:prstGeom>
+        </p:spPr>
+        <p:txBody>
+          <a:bodyPr anchorCtr="0" anchor="ctr" bIns="91425" lIns="91425" spcFirstLastPara="1" rIns="91425" wrap="square" tIns="91425">
+            <a:normAutofit/>
+          </a:bodyPr>
+          <a:lstStyle/>
+          <a:p>
+            <a:pPr indent="0" lvl="0" marL="0" rtl="0" algn="ctr">
+              <a:spcBef>
+                <a:spcPts val="0"/>
+              </a:spcBef>
+              <a:spcAft>
+                <a:spcPts val="0"/>
+              </a:spcAft>
+              <a:buNone/>
+            </a:pPr>
+            <a:r>
+              <a:t/>
+            </a:r>
+            <a:endParaRPr/>
+          </a:p>
+        </p:txBody>
+      </p:sp>
+    </p:spTree>
+  </p:cSld>
+  <p:clrMapOvr>
+    <a:masterClrMapping/>
+  </p:clrMapOvr>
+</p:sld>
+</file>
+
 <file path=ppt/theme/theme1.xml><?xml version="1.0" encoding="utf-8"?>
 <a:theme xmlns:a="http://schemas.openxmlformats.org/drawingml/2006/main" xmlns:r="http://schemas.openxmlformats.org/officeDocument/2006/relationships">
   <a:themeElements>

</xml_diff>